<commit_message>
Illustrations updated, failed shift percentage displayed only if APs are selected
</commit_message>
<xml_diff>
--- a/Documentation/Illustrations/080_file-open-joblist.pptx
+++ b/Documentation/Illustrations/080_file-open-joblist.pptx
@@ -288,7 +288,7 @@
           <a:p>
             <a:fld id="{B8FB1E64-4CB3-400A-8546-413A16338C43}" type="datetimeFigureOut">
               <a:rPr lang="de-DE" smtClean="0"/>
-              <a:t>15.08.2019</a:t>
+              <a:t>18.01.2020</a:t>
             </a:fld>
             <a:endParaRPr lang="de-DE"/>
           </a:p>
@@ -458,7 +458,7 @@
           <a:p>
             <a:fld id="{B8FB1E64-4CB3-400A-8546-413A16338C43}" type="datetimeFigureOut">
               <a:rPr lang="de-DE" smtClean="0"/>
-              <a:t>15.08.2019</a:t>
+              <a:t>18.01.2020</a:t>
             </a:fld>
             <a:endParaRPr lang="de-DE"/>
           </a:p>
@@ -638,7 +638,7 @@
           <a:p>
             <a:fld id="{B8FB1E64-4CB3-400A-8546-413A16338C43}" type="datetimeFigureOut">
               <a:rPr lang="de-DE" smtClean="0"/>
-              <a:t>15.08.2019</a:t>
+              <a:t>18.01.2020</a:t>
             </a:fld>
             <a:endParaRPr lang="de-DE"/>
           </a:p>
@@ -808,7 +808,7 @@
           <a:p>
             <a:fld id="{B8FB1E64-4CB3-400A-8546-413A16338C43}" type="datetimeFigureOut">
               <a:rPr lang="de-DE" smtClean="0"/>
-              <a:t>15.08.2019</a:t>
+              <a:t>18.01.2020</a:t>
             </a:fld>
             <a:endParaRPr lang="de-DE"/>
           </a:p>
@@ -1054,7 +1054,7 @@
           <a:p>
             <a:fld id="{B8FB1E64-4CB3-400A-8546-413A16338C43}" type="datetimeFigureOut">
               <a:rPr lang="de-DE" smtClean="0"/>
-              <a:t>15.08.2019</a:t>
+              <a:t>18.01.2020</a:t>
             </a:fld>
             <a:endParaRPr lang="de-DE"/>
           </a:p>
@@ -1342,7 +1342,7 @@
           <a:p>
             <a:fld id="{B8FB1E64-4CB3-400A-8546-413A16338C43}" type="datetimeFigureOut">
               <a:rPr lang="de-DE" smtClean="0"/>
-              <a:t>15.08.2019</a:t>
+              <a:t>18.01.2020</a:t>
             </a:fld>
             <a:endParaRPr lang="de-DE"/>
           </a:p>
@@ -1764,7 +1764,7 @@
           <a:p>
             <a:fld id="{B8FB1E64-4CB3-400A-8546-413A16338C43}" type="datetimeFigureOut">
               <a:rPr lang="de-DE" smtClean="0"/>
-              <a:t>15.08.2019</a:t>
+              <a:t>18.01.2020</a:t>
             </a:fld>
             <a:endParaRPr lang="de-DE"/>
           </a:p>
@@ -1882,7 +1882,7 @@
           <a:p>
             <a:fld id="{B8FB1E64-4CB3-400A-8546-413A16338C43}" type="datetimeFigureOut">
               <a:rPr lang="de-DE" smtClean="0"/>
-              <a:t>15.08.2019</a:t>
+              <a:t>18.01.2020</a:t>
             </a:fld>
             <a:endParaRPr lang="de-DE"/>
           </a:p>
@@ -1977,7 +1977,7 @@
           <a:p>
             <a:fld id="{B8FB1E64-4CB3-400A-8546-413A16338C43}" type="datetimeFigureOut">
               <a:rPr lang="de-DE" smtClean="0"/>
-              <a:t>15.08.2019</a:t>
+              <a:t>18.01.2020</a:t>
             </a:fld>
             <a:endParaRPr lang="de-DE"/>
           </a:p>
@@ -2254,7 +2254,7 @@
           <a:p>
             <a:fld id="{B8FB1E64-4CB3-400A-8546-413A16338C43}" type="datetimeFigureOut">
               <a:rPr lang="de-DE" smtClean="0"/>
-              <a:t>15.08.2019</a:t>
+              <a:t>18.01.2020</a:t>
             </a:fld>
             <a:endParaRPr lang="de-DE"/>
           </a:p>
@@ -2507,7 +2507,7 @@
           <a:p>
             <a:fld id="{B8FB1E64-4CB3-400A-8546-413A16338C43}" type="datetimeFigureOut">
               <a:rPr lang="de-DE" smtClean="0"/>
-              <a:t>15.08.2019</a:t>
+              <a:t>18.01.2020</a:t>
             </a:fld>
             <a:endParaRPr lang="de-DE"/>
           </a:p>
@@ -2720,7 +2720,7 @@
           <a:p>
             <a:fld id="{B8FB1E64-4CB3-400A-8546-413A16338C43}" type="datetimeFigureOut">
               <a:rPr lang="de-DE" smtClean="0"/>
-              <a:t>15.08.2019</a:t>
+              <a:t>18.01.2020</a:t>
             </a:fld>
             <a:endParaRPr lang="de-DE"/>
           </a:p>
@@ -3097,7 +3097,7 @@
       </p:grpSpPr>
       <p:pic>
         <p:nvPicPr>
-          <p:cNvPr id="2" name="Grafik 1"/>
+          <p:cNvPr id="3" name="Grafik 2"/>
           <p:cNvPicPr>
             <a:picLocks noChangeAspect="1"/>
           </p:cNvPicPr>
@@ -3117,8 +3117,8 @@
         </p:blipFill>
         <p:spPr>
           <a:xfrm>
-            <a:off x="0" y="55464"/>
-            <a:ext cx="9144000" cy="6526443"/>
+            <a:off x="0" y="149561"/>
+            <a:ext cx="9144000" cy="6558877"/>
           </a:xfrm>
           <a:prstGeom prst="rect">
             <a:avLst/>
@@ -3214,7 +3214,7 @@
         </p:nvSpPr>
         <p:spPr>
           <a:xfrm>
-            <a:off x="6075183" y="2028126"/>
+            <a:off x="5522296" y="2145551"/>
             <a:ext cx="155448" cy="576064"/>
           </a:xfrm>
           <a:prstGeom prst="rightBrace">
@@ -3257,7 +3257,7 @@
         </p:nvSpPr>
         <p:spPr>
           <a:xfrm>
-            <a:off x="6240503" y="2131492"/>
+            <a:off x="5687616" y="2248917"/>
             <a:ext cx="2771800" cy="369332"/>
           </a:xfrm>
           <a:prstGeom prst="rect">
@@ -3307,8 +3307,8 @@
         </p:nvCxnSpPr>
         <p:spPr>
           <a:xfrm flipH="1" flipV="1">
-            <a:off x="5049228" y="1984234"/>
-            <a:ext cx="1080120" cy="1224137"/>
+            <a:off x="4499992" y="2060848"/>
+            <a:ext cx="1944216" cy="1728193"/>
           </a:xfrm>
           <a:prstGeom prst="straightConnector1">
             <a:avLst/>
@@ -3343,7 +3343,7 @@
         </p:nvSpPr>
         <p:spPr>
           <a:xfrm>
-            <a:off x="6129348" y="2889811"/>
+            <a:off x="6432748" y="3465874"/>
             <a:ext cx="2475100" cy="646331"/>
           </a:xfrm>
           <a:prstGeom prst="rect">

</xml_diff>